<commit_message>
Added a few more slides, though they were hidden (so they could be used later if we so desire).
</commit_message>
<xml_diff>
--- a/ChaprSVN/Promo/WESTA Presentation.pptx
+++ b/ChaprSVN/Promo/WESTA Presentation.pptx
@@ -13,6 +13,9 @@
     <p:sldId id="259" r:id="rId7"/>
     <p:sldId id="263" r:id="rId8"/>
     <p:sldId id="264" r:id="rId9"/>
+    <p:sldId id="265" r:id="rId10"/>
+    <p:sldId id="266" r:id="rId11"/>
+    <p:sldId id="267" r:id="rId12"/>
   </p:sldIdLst>
   <p:sldSz cx="9144000" cy="6858000" type="screen4x3"/>
   <p:notesSz cx="6858000" cy="9144000"/>
@@ -296,7 +299,7 @@
             <a:fld id="{1D8BD707-D9CF-40AE-B4C6-C98DA3205C09}" type="datetimeFigureOut">
               <a:rPr lang="en-US" smtClean="0"/>
               <a:pPr/>
-              <a:t>5/22/2013</a:t>
+              <a:t>5/23/2013</a:t>
             </a:fld>
             <a:endParaRPr lang="en-US"/>
           </a:p>
@@ -463,7 +466,7 @@
             <a:fld id="{1D8BD707-D9CF-40AE-B4C6-C98DA3205C09}" type="datetimeFigureOut">
               <a:rPr lang="en-US" smtClean="0"/>
               <a:pPr/>
-              <a:t>5/22/2013</a:t>
+              <a:t>5/23/2013</a:t>
             </a:fld>
             <a:endParaRPr lang="en-US"/>
           </a:p>
@@ -640,7 +643,7 @@
             <a:fld id="{1D8BD707-D9CF-40AE-B4C6-C98DA3205C09}" type="datetimeFigureOut">
               <a:rPr lang="en-US" smtClean="0"/>
               <a:pPr/>
-              <a:t>5/22/2013</a:t>
+              <a:t>5/23/2013</a:t>
             </a:fld>
             <a:endParaRPr lang="en-US"/>
           </a:p>
@@ -807,7 +810,7 @@
             <a:fld id="{1D8BD707-D9CF-40AE-B4C6-C98DA3205C09}" type="datetimeFigureOut">
               <a:rPr lang="en-US" smtClean="0"/>
               <a:pPr/>
-              <a:t>5/22/2013</a:t>
+              <a:t>5/23/2013</a:t>
             </a:fld>
             <a:endParaRPr lang="en-US"/>
           </a:p>
@@ -1050,7 +1053,7 @@
             <a:fld id="{1D8BD707-D9CF-40AE-B4C6-C98DA3205C09}" type="datetimeFigureOut">
               <a:rPr lang="en-US" smtClean="0"/>
               <a:pPr/>
-              <a:t>5/22/2013</a:t>
+              <a:t>5/23/2013</a:t>
             </a:fld>
             <a:endParaRPr lang="en-US"/>
           </a:p>
@@ -1335,7 +1338,7 @@
             <a:fld id="{1D8BD707-D9CF-40AE-B4C6-C98DA3205C09}" type="datetimeFigureOut">
               <a:rPr lang="en-US" smtClean="0"/>
               <a:pPr/>
-              <a:t>5/22/2013</a:t>
+              <a:t>5/23/2013</a:t>
             </a:fld>
             <a:endParaRPr lang="en-US"/>
           </a:p>
@@ -1754,7 +1757,7 @@
             <a:fld id="{1D8BD707-D9CF-40AE-B4C6-C98DA3205C09}" type="datetimeFigureOut">
               <a:rPr lang="en-US" smtClean="0"/>
               <a:pPr/>
-              <a:t>5/22/2013</a:t>
+              <a:t>5/23/2013</a:t>
             </a:fld>
             <a:endParaRPr lang="en-US"/>
           </a:p>
@@ -1869,7 +1872,7 @@
             <a:fld id="{1D8BD707-D9CF-40AE-B4C6-C98DA3205C09}" type="datetimeFigureOut">
               <a:rPr lang="en-US" smtClean="0"/>
               <a:pPr/>
-              <a:t>5/22/2013</a:t>
+              <a:t>5/23/2013</a:t>
             </a:fld>
             <a:endParaRPr lang="en-US"/>
           </a:p>
@@ -1961,7 +1964,7 @@
             <a:fld id="{1D8BD707-D9CF-40AE-B4C6-C98DA3205C09}" type="datetimeFigureOut">
               <a:rPr lang="en-US" smtClean="0"/>
               <a:pPr/>
-              <a:t>5/22/2013</a:t>
+              <a:t>5/23/2013</a:t>
             </a:fld>
             <a:endParaRPr lang="en-US"/>
           </a:p>
@@ -2235,7 +2238,7 @@
             <a:fld id="{1D8BD707-D9CF-40AE-B4C6-C98DA3205C09}" type="datetimeFigureOut">
               <a:rPr lang="en-US" smtClean="0"/>
               <a:pPr/>
-              <a:t>5/22/2013</a:t>
+              <a:t>5/23/2013</a:t>
             </a:fld>
             <a:endParaRPr lang="en-US"/>
           </a:p>
@@ -2485,7 +2488,7 @@
             <a:fld id="{1D8BD707-D9CF-40AE-B4C6-C98DA3205C09}" type="datetimeFigureOut">
               <a:rPr lang="en-US" smtClean="0"/>
               <a:pPr/>
-              <a:t>5/22/2013</a:t>
+              <a:t>5/23/2013</a:t>
             </a:fld>
             <a:endParaRPr lang="en-US"/>
           </a:p>
@@ -2695,7 +2698,7 @@
             <a:fld id="{1D8BD707-D9CF-40AE-B4C6-C98DA3205C09}" type="datetimeFigureOut">
               <a:rPr lang="en-US" smtClean="0"/>
               <a:pPr/>
-              <a:t>5/22/2013</a:t>
+              <a:t>5/23/2013</a:t>
             </a:fld>
             <a:endParaRPr lang="en-US"/>
           </a:p>
@@ -3112,6 +3115,316 @@
 </p:sld>
 </file>
 
+<file path=ppt/slides/slide10.xml><?xml version="1.0" encoding="utf-8"?>
+<p:sld xmlns:a="http://schemas.openxmlformats.org/drawingml/2006/main" xmlns:r="http://schemas.openxmlformats.org/officeDocument/2006/relationships" xmlns:p="http://schemas.openxmlformats.org/presentationml/2006/main">
+  <p:cSld>
+    <p:spTree>
+      <p:nvGrpSpPr>
+        <p:cNvPr id="1" name=""/>
+        <p:cNvGrpSpPr/>
+        <p:nvPr/>
+      </p:nvGrpSpPr>
+      <p:grpSpPr>
+        <a:xfrm>
+          <a:off x="0" y="0"/>
+          <a:ext cx="0" cy="0"/>
+          <a:chOff x="0" y="0"/>
+          <a:chExt cx="0" cy="0"/>
+        </a:xfrm>
+      </p:grpSpPr>
+      <p:sp>
+        <p:nvSpPr>
+          <p:cNvPr id="2" name="Title 1"/>
+          <p:cNvSpPr>
+            <a:spLocks noGrp="1"/>
+          </p:cNvSpPr>
+          <p:nvPr>
+            <p:ph type="title"/>
+          </p:nvPr>
+        </p:nvSpPr>
+        <p:spPr/>
+        <p:txBody>
+          <a:bodyPr/>
+          <a:lstStyle/>
+          <a:p>
+            <a:r>
+              <a:rPr lang="en-US" dirty="0" smtClean="0">
+                <a:solidFill>
+                  <a:schemeClr val="tx2">
+                    <a:lumMod val="40000"/>
+                    <a:lumOff val="60000"/>
+                  </a:schemeClr>
+                </a:solidFill>
+              </a:rPr>
+              <a:t>Promotion</a:t>
+            </a:r>
+            <a:endParaRPr lang="en-US" dirty="0">
+              <a:solidFill>
+                <a:schemeClr val="tx2">
+                  <a:lumMod val="40000"/>
+                  <a:lumOff val="60000"/>
+                </a:schemeClr>
+              </a:solidFill>
+            </a:endParaRPr>
+          </a:p>
+        </p:txBody>
+      </p:sp>
+      <p:sp>
+        <p:nvSpPr>
+          <p:cNvPr id="3" name="Content Placeholder 2"/>
+          <p:cNvSpPr>
+            <a:spLocks noGrp="1"/>
+          </p:cNvSpPr>
+          <p:nvPr>
+            <p:ph idx="1"/>
+          </p:nvPr>
+        </p:nvSpPr>
+        <p:spPr/>
+        <p:txBody>
+          <a:bodyPr>
+            <a:normAutofit lnSpcReduction="10000"/>
+          </a:bodyPr>
+          <a:lstStyle/>
+          <a:p>
+            <a:r>
+              <a:rPr lang="en-US" dirty="0" smtClean="0"/>
+              <a:t>FTC World Championships</a:t>
+            </a:r>
+          </a:p>
+          <a:p>
+            <a:pPr lvl="1"/>
+            <a:r>
+              <a:rPr lang="en-US" dirty="0" smtClean="0"/>
+              <a:t>Assessed interest level (8.5 out of 10)</a:t>
+            </a:r>
+          </a:p>
+          <a:p>
+            <a:pPr lvl="1"/>
+            <a:r>
+              <a:rPr lang="en-US" dirty="0" smtClean="0"/>
+              <a:t>Tested the prototype (1</a:t>
+            </a:r>
+            <a:r>
+              <a:rPr lang="en-US" baseline="30000" dirty="0" smtClean="0"/>
+              <a:t>st</a:t>
+            </a:r>
+            <a:r>
+              <a:rPr lang="en-US" dirty="0" smtClean="0"/>
+              <a:t> time connection needed work, but worked beautifully from then on)</a:t>
+            </a:r>
+          </a:p>
+          <a:p>
+            <a:r>
+              <a:rPr lang="en-US" dirty="0" smtClean="0"/>
+              <a:t>Commercial</a:t>
+            </a:r>
+          </a:p>
+          <a:p>
+            <a:pPr lvl="1"/>
+            <a:r>
+              <a:rPr lang="en-US" dirty="0" smtClean="0"/>
+              <a:t>Highlights problems without the </a:t>
+            </a:r>
+            <a:r>
+              <a:rPr lang="en-US" dirty="0" err="1" smtClean="0"/>
+              <a:t>ChapR</a:t>
+            </a:r>
+            <a:r>
+              <a:rPr lang="en-US" dirty="0" smtClean="0"/>
+              <a:t> (in 3 scenarios)</a:t>
+            </a:r>
+          </a:p>
+          <a:p>
+            <a:pPr lvl="1"/>
+            <a:r>
+              <a:rPr lang="en-US" dirty="0" smtClean="0"/>
+              <a:t>Explains how the </a:t>
+            </a:r>
+            <a:r>
+              <a:rPr lang="en-US" dirty="0" err="1" smtClean="0"/>
+              <a:t>ChapR</a:t>
+            </a:r>
+            <a:r>
+              <a:rPr lang="en-US" dirty="0" smtClean="0"/>
+              <a:t> solves each</a:t>
+            </a:r>
+          </a:p>
+          <a:p>
+            <a:pPr lvl="1"/>
+            <a:r>
+              <a:rPr lang="en-US" dirty="0" err="1" smtClean="0"/>
+              <a:t>Demoes</a:t>
+            </a:r>
+            <a:r>
+              <a:rPr lang="en-US" dirty="0" smtClean="0"/>
+              <a:t> the </a:t>
+            </a:r>
+            <a:r>
+              <a:rPr lang="en-US" dirty="0" err="1" smtClean="0"/>
+              <a:t>ChapR</a:t>
+            </a:r>
+            <a:endParaRPr lang="en-US" dirty="0" smtClean="0"/>
+          </a:p>
+          <a:p>
+            <a:endParaRPr lang="en-US" dirty="0" smtClean="0"/>
+          </a:p>
+        </p:txBody>
+      </p:sp>
+    </p:spTree>
+  </p:cSld>
+  <p:clrMapOvr>
+    <a:masterClrMapping/>
+  </p:clrMapOvr>
+</p:sld>
+</file>
+
+<file path=ppt/slides/slide11.xml><?xml version="1.0" encoding="utf-8"?>
+<p:sld xmlns:a="http://schemas.openxmlformats.org/drawingml/2006/main" xmlns:r="http://schemas.openxmlformats.org/officeDocument/2006/relationships" xmlns:p="http://schemas.openxmlformats.org/presentationml/2006/main" show="0">
+  <p:cSld>
+    <p:spTree>
+      <p:nvGrpSpPr>
+        <p:cNvPr id="1" name=""/>
+        <p:cNvGrpSpPr/>
+        <p:nvPr/>
+      </p:nvGrpSpPr>
+      <p:grpSpPr>
+        <a:xfrm>
+          <a:off x="0" y="0"/>
+          <a:ext cx="0" cy="0"/>
+          <a:chOff x="0" y="0"/>
+          <a:chExt cx="0" cy="0"/>
+        </a:xfrm>
+      </p:grpSpPr>
+      <p:sp>
+        <p:nvSpPr>
+          <p:cNvPr id="2" name="Title 1"/>
+          <p:cNvSpPr>
+            <a:spLocks noGrp="1"/>
+          </p:cNvSpPr>
+          <p:nvPr>
+            <p:ph type="title"/>
+          </p:nvPr>
+        </p:nvSpPr>
+        <p:spPr/>
+        <p:txBody>
+          <a:bodyPr/>
+          <a:lstStyle/>
+          <a:p>
+            <a:r>
+              <a:rPr lang="en-US" dirty="0" smtClean="0">
+                <a:solidFill>
+                  <a:schemeClr val="tx2">
+                    <a:lumMod val="40000"/>
+                    <a:lumOff val="60000"/>
+                  </a:schemeClr>
+                </a:solidFill>
+              </a:rPr>
+              <a:t>Future Promotion</a:t>
+            </a:r>
+            <a:endParaRPr lang="en-US" dirty="0">
+              <a:solidFill>
+                <a:schemeClr val="tx2">
+                  <a:lumMod val="40000"/>
+                  <a:lumOff val="60000"/>
+                </a:schemeClr>
+              </a:solidFill>
+            </a:endParaRPr>
+          </a:p>
+        </p:txBody>
+      </p:sp>
+      <p:sp>
+        <p:nvSpPr>
+          <p:cNvPr id="3" name="Content Placeholder 2"/>
+          <p:cNvSpPr>
+            <a:spLocks noGrp="1"/>
+          </p:cNvSpPr>
+          <p:nvPr>
+            <p:ph idx="1"/>
+          </p:nvPr>
+        </p:nvSpPr>
+        <p:spPr/>
+        <p:txBody>
+          <a:bodyPr>
+            <a:normAutofit lnSpcReduction="10000"/>
+          </a:bodyPr>
+          <a:lstStyle/>
+          <a:p>
+            <a:r>
+              <a:rPr lang="en-US" dirty="0" smtClean="0"/>
+              <a:t>Outtakes</a:t>
+            </a:r>
+          </a:p>
+          <a:p>
+            <a:pPr lvl="1"/>
+            <a:r>
+              <a:rPr lang="en-US" dirty="0" smtClean="0"/>
+              <a:t>Comedic relief on the website/</a:t>
+            </a:r>
+            <a:r>
+              <a:rPr lang="en-US" dirty="0" err="1" smtClean="0"/>
+              <a:t>youtube</a:t>
+            </a:r>
+            <a:r>
+              <a:rPr lang="en-US" dirty="0" smtClean="0"/>
+              <a:t> channel of our attempts to make a commercial</a:t>
+            </a:r>
+          </a:p>
+          <a:p>
+            <a:r>
+              <a:rPr lang="en-US" dirty="0" smtClean="0"/>
+              <a:t>“</a:t>
+            </a:r>
+            <a:r>
+              <a:rPr lang="en-US" dirty="0" err="1" smtClean="0"/>
+              <a:t>Appisodes</a:t>
+            </a:r>
+            <a:r>
+              <a:rPr lang="en-US" dirty="0" smtClean="0"/>
+              <a:t>”</a:t>
+            </a:r>
+          </a:p>
+          <a:p>
+            <a:pPr lvl="1"/>
+            <a:r>
+              <a:rPr lang="en-US" dirty="0" smtClean="0"/>
+              <a:t>Scenarios where the </a:t>
+            </a:r>
+            <a:r>
+              <a:rPr lang="en-US" dirty="0" err="1" smtClean="0"/>
+              <a:t>ChapR</a:t>
+            </a:r>
+            <a:r>
+              <a:rPr lang="en-US" dirty="0" smtClean="0"/>
+              <a:t> is needed (and/or comes in to save the day)</a:t>
+            </a:r>
+          </a:p>
+          <a:p>
+            <a:r>
+              <a:rPr lang="en-US" dirty="0" smtClean="0"/>
+              <a:t>Australia</a:t>
+            </a:r>
+          </a:p>
+          <a:p>
+            <a:pPr lvl="1"/>
+            <a:r>
+              <a:rPr lang="en-US" dirty="0" smtClean="0"/>
+              <a:t>Sending a prototype to the Asia Pacific Qualifier for some overseas exposure</a:t>
+            </a:r>
+          </a:p>
+          <a:p>
+            <a:endParaRPr lang="en-US" dirty="0" smtClean="0"/>
+          </a:p>
+        </p:txBody>
+      </p:sp>
+    </p:spTree>
+  </p:cSld>
+  <p:clrMapOvr>
+    <a:masterClrMapping/>
+  </p:clrMapOvr>
+  <p:transition/>
+</p:sld>
+</file>
+
 <file path=ppt/slides/slide2.xml><?xml version="1.0" encoding="utf-8"?>
 <p:sld xmlns:a="http://schemas.openxmlformats.org/drawingml/2006/main" xmlns:r="http://schemas.openxmlformats.org/officeDocument/2006/relationships" xmlns:p="http://schemas.openxmlformats.org/presentationml/2006/main">
   <p:cSld>
@@ -3779,13 +4092,8 @@
           <a:p>
             <a:r>
               <a:rPr lang="en-US" sz="2000" dirty="0" smtClean="0"/>
-              <a:t>Bluetooth module (which sends the joystick input to the NXT</a:t>
-            </a:r>
-            <a:r>
-              <a:rPr lang="en-US" sz="2000" dirty="0" smtClean="0"/>
-              <a:t>)</a:t>
-            </a:r>
-            <a:endParaRPr lang="en-US" sz="2000" dirty="0" smtClean="0"/>
+              <a:t>Bluetooth module (which sends the joystick input to the NXT)</a:t>
+            </a:r>
           </a:p>
         </p:txBody>
       </p:sp>
@@ -3950,6 +4258,90 @@
   <p:clrMapOvr>
     <a:masterClrMapping/>
   </p:clrMapOvr>
+</p:sld>
+</file>
+
+<file path=ppt/slides/slide9.xml><?xml version="1.0" encoding="utf-8"?>
+<p:sld xmlns:a="http://schemas.openxmlformats.org/drawingml/2006/main" xmlns:r="http://schemas.openxmlformats.org/officeDocument/2006/relationships" xmlns:p="http://schemas.openxmlformats.org/presentationml/2006/main" show="0">
+  <p:cSld>
+    <p:spTree>
+      <p:nvGrpSpPr>
+        <p:cNvPr id="1" name=""/>
+        <p:cNvGrpSpPr/>
+        <p:nvPr/>
+      </p:nvGrpSpPr>
+      <p:grpSpPr>
+        <a:xfrm>
+          <a:off x="0" y="0"/>
+          <a:ext cx="0" cy="0"/>
+          <a:chOff x="0" y="0"/>
+          <a:chExt cx="0" cy="0"/>
+        </a:xfrm>
+      </p:grpSpPr>
+      <p:sp>
+        <p:nvSpPr>
+          <p:cNvPr id="2" name="Title 1"/>
+          <p:cNvSpPr>
+            <a:spLocks noGrp="1"/>
+          </p:cNvSpPr>
+          <p:nvPr>
+            <p:ph type="title"/>
+          </p:nvPr>
+        </p:nvSpPr>
+        <p:spPr/>
+        <p:txBody>
+          <a:bodyPr/>
+          <a:lstStyle/>
+          <a:p>
+            <a:r>
+              <a:rPr lang="en-US" dirty="0" smtClean="0">
+                <a:solidFill>
+                  <a:schemeClr val="tx2">
+                    <a:lumMod val="40000"/>
+                    <a:lumOff val="60000"/>
+                  </a:schemeClr>
+                </a:solidFill>
+              </a:rPr>
+              <a:t>Timeline</a:t>
+            </a:r>
+            <a:endParaRPr lang="en-US" dirty="0">
+              <a:solidFill>
+                <a:schemeClr val="tx2">
+                  <a:lumMod val="40000"/>
+                  <a:lumOff val="60000"/>
+                </a:schemeClr>
+              </a:solidFill>
+            </a:endParaRPr>
+          </a:p>
+        </p:txBody>
+      </p:sp>
+      <p:sp>
+        <p:nvSpPr>
+          <p:cNvPr id="3" name="Content Placeholder 2"/>
+          <p:cNvSpPr>
+            <a:spLocks noGrp="1"/>
+          </p:cNvSpPr>
+          <p:nvPr>
+            <p:ph idx="1"/>
+          </p:nvPr>
+        </p:nvSpPr>
+        <p:spPr/>
+        <p:txBody>
+          <a:bodyPr>
+            <a:normAutofit/>
+          </a:bodyPr>
+          <a:lstStyle/>
+          <a:p>
+            <a:endParaRPr lang="en-US" dirty="0"/>
+          </a:p>
+        </p:txBody>
+      </p:sp>
+    </p:spTree>
+  </p:cSld>
+  <p:clrMapOvr>
+    <a:masterClrMapping/>
+  </p:clrMapOvr>
+  <p:transition/>
 </p:sld>
 </file>
 

</xml_diff>

<commit_message>
Made some minor edits and added the pictures of the old prototype (we can swap in pictures of the new prototype when we get it).
</commit_message>
<xml_diff>
--- a/ChaprSVN/Promo/WESTA Presentation.pptx
+++ b/ChaprSVN/Promo/WESTA Presentation.pptx
@@ -299,7 +299,7 @@
             <a:fld id="{1D8BD707-D9CF-40AE-B4C6-C98DA3205C09}" type="datetimeFigureOut">
               <a:rPr lang="en-US" smtClean="0"/>
               <a:pPr/>
-              <a:t>5/23/2013</a:t>
+              <a:t>5/24/2013</a:t>
             </a:fld>
             <a:endParaRPr lang="en-US"/>
           </a:p>
@@ -466,7 +466,7 @@
             <a:fld id="{1D8BD707-D9CF-40AE-B4C6-C98DA3205C09}" type="datetimeFigureOut">
               <a:rPr lang="en-US" smtClean="0"/>
               <a:pPr/>
-              <a:t>5/23/2013</a:t>
+              <a:t>5/24/2013</a:t>
             </a:fld>
             <a:endParaRPr lang="en-US"/>
           </a:p>
@@ -643,7 +643,7 @@
             <a:fld id="{1D8BD707-D9CF-40AE-B4C6-C98DA3205C09}" type="datetimeFigureOut">
               <a:rPr lang="en-US" smtClean="0"/>
               <a:pPr/>
-              <a:t>5/23/2013</a:t>
+              <a:t>5/24/2013</a:t>
             </a:fld>
             <a:endParaRPr lang="en-US"/>
           </a:p>
@@ -810,7 +810,7 @@
             <a:fld id="{1D8BD707-D9CF-40AE-B4C6-C98DA3205C09}" type="datetimeFigureOut">
               <a:rPr lang="en-US" smtClean="0"/>
               <a:pPr/>
-              <a:t>5/23/2013</a:t>
+              <a:t>5/24/2013</a:t>
             </a:fld>
             <a:endParaRPr lang="en-US"/>
           </a:p>
@@ -1053,7 +1053,7 @@
             <a:fld id="{1D8BD707-D9CF-40AE-B4C6-C98DA3205C09}" type="datetimeFigureOut">
               <a:rPr lang="en-US" smtClean="0"/>
               <a:pPr/>
-              <a:t>5/23/2013</a:t>
+              <a:t>5/24/2013</a:t>
             </a:fld>
             <a:endParaRPr lang="en-US"/>
           </a:p>
@@ -1338,7 +1338,7 @@
             <a:fld id="{1D8BD707-D9CF-40AE-B4C6-C98DA3205C09}" type="datetimeFigureOut">
               <a:rPr lang="en-US" smtClean="0"/>
               <a:pPr/>
-              <a:t>5/23/2013</a:t>
+              <a:t>5/24/2013</a:t>
             </a:fld>
             <a:endParaRPr lang="en-US"/>
           </a:p>
@@ -1757,7 +1757,7 @@
             <a:fld id="{1D8BD707-D9CF-40AE-B4C6-C98DA3205C09}" type="datetimeFigureOut">
               <a:rPr lang="en-US" smtClean="0"/>
               <a:pPr/>
-              <a:t>5/23/2013</a:t>
+              <a:t>5/24/2013</a:t>
             </a:fld>
             <a:endParaRPr lang="en-US"/>
           </a:p>
@@ -1872,7 +1872,7 @@
             <a:fld id="{1D8BD707-D9CF-40AE-B4C6-C98DA3205C09}" type="datetimeFigureOut">
               <a:rPr lang="en-US" smtClean="0"/>
               <a:pPr/>
-              <a:t>5/23/2013</a:t>
+              <a:t>5/24/2013</a:t>
             </a:fld>
             <a:endParaRPr lang="en-US"/>
           </a:p>
@@ -1964,7 +1964,7 @@
             <a:fld id="{1D8BD707-D9CF-40AE-B4C6-C98DA3205C09}" type="datetimeFigureOut">
               <a:rPr lang="en-US" smtClean="0"/>
               <a:pPr/>
-              <a:t>5/23/2013</a:t>
+              <a:t>5/24/2013</a:t>
             </a:fld>
             <a:endParaRPr lang="en-US"/>
           </a:p>
@@ -2238,7 +2238,7 @@
             <a:fld id="{1D8BD707-D9CF-40AE-B4C6-C98DA3205C09}" type="datetimeFigureOut">
               <a:rPr lang="en-US" smtClean="0"/>
               <a:pPr/>
-              <a:t>5/23/2013</a:t>
+              <a:t>5/24/2013</a:t>
             </a:fld>
             <a:endParaRPr lang="en-US"/>
           </a:p>
@@ -2488,7 +2488,7 @@
             <a:fld id="{1D8BD707-D9CF-40AE-B4C6-C98DA3205C09}" type="datetimeFigureOut">
               <a:rPr lang="en-US" smtClean="0"/>
               <a:pPr/>
-              <a:t>5/23/2013</a:t>
+              <a:t>5/24/2013</a:t>
             </a:fld>
             <a:endParaRPr lang="en-US"/>
           </a:p>
@@ -2698,7 +2698,7 @@
             <a:fld id="{1D8BD707-D9CF-40AE-B4C6-C98DA3205C09}" type="datetimeFigureOut">
               <a:rPr lang="en-US" smtClean="0"/>
               <a:pPr/>
-              <a:t>5/23/2013</a:t>
+              <a:t>5/24/2013</a:t>
             </a:fld>
             <a:endParaRPr lang="en-US"/>
           </a:p>
@@ -3084,7 +3084,15 @@
           <a:bodyPr/>
           <a:lstStyle/>
           <a:p>
-            <a:endParaRPr lang="en-US"/>
+            <a:r>
+              <a:rPr lang="en-US" dirty="0" smtClean="0"/>
+              <a:t>The </a:t>
+            </a:r>
+            <a:r>
+              <a:rPr lang="en-US" dirty="0" err="1" smtClean="0"/>
+              <a:t>ChapR</a:t>
+            </a:r>
+            <a:endParaRPr lang="en-US" dirty="0"/>
           </a:p>
         </p:txBody>
       </p:sp>
@@ -3846,12 +3854,6 @@
           <a:p>
             <a:r>
               <a:rPr lang="en-US" dirty="0" smtClean="0"/>
-              <a:t>Someone to accept money from the website</a:t>
-            </a:r>
-          </a:p>
-          <a:p>
-            <a:r>
-              <a:rPr lang="en-US" dirty="0" smtClean="0"/>
               <a:t>A 501c3 non-profit organization to accept money and assure people that they won’t have to pay taxes</a:t>
             </a:r>
           </a:p>
@@ -3953,6 +3955,30 @@
           </a:p>
         </p:txBody>
       </p:sp>
+      <p:pic>
+        <p:nvPicPr>
+          <p:cNvPr id="4" name="Picture 3" descr="photo 4.JPG"/>
+          <p:cNvPicPr>
+            <a:picLocks noChangeAspect="1"/>
+          </p:cNvPicPr>
+          <p:nvPr/>
+        </p:nvPicPr>
+        <p:blipFill>
+          <a:blip r:embed="rId2" cstate="print"/>
+          <a:stretch>
+            <a:fillRect/>
+          </a:stretch>
+        </p:blipFill>
+        <p:spPr>
+          <a:xfrm>
+            <a:off x="2667000" y="2438400"/>
+            <a:ext cx="3860800" cy="2895600"/>
+          </a:xfrm>
+          <a:prstGeom prst="rect">
+            <a:avLst/>
+          </a:prstGeom>
+        </p:spPr>
+      </p:pic>
     </p:spTree>
   </p:cSld>
   <p:clrMapOvr>
@@ -4097,6 +4123,54 @@
           </a:p>
         </p:txBody>
       </p:sp>
+      <p:pic>
+        <p:nvPicPr>
+          <p:cNvPr id="4" name="Picture 3" descr="photo (3).jpg"/>
+          <p:cNvPicPr>
+            <a:picLocks noChangeAspect="1"/>
+          </p:cNvPicPr>
+          <p:nvPr/>
+        </p:nvPicPr>
+        <p:blipFill>
+          <a:blip r:embed="rId2" cstate="print"/>
+          <a:stretch>
+            <a:fillRect/>
+          </a:stretch>
+        </p:blipFill>
+        <p:spPr>
+          <a:xfrm>
+            <a:off x="914400" y="4191000"/>
+            <a:ext cx="3200400" cy="2400300"/>
+          </a:xfrm>
+          <a:prstGeom prst="rect">
+            <a:avLst/>
+          </a:prstGeom>
+        </p:spPr>
+      </p:pic>
+      <p:pic>
+        <p:nvPicPr>
+          <p:cNvPr id="6" name="Picture 5" descr="photo (2).jpg"/>
+          <p:cNvPicPr>
+            <a:picLocks noChangeAspect="1"/>
+          </p:cNvPicPr>
+          <p:nvPr/>
+        </p:nvPicPr>
+        <p:blipFill>
+          <a:blip r:embed="rId3" cstate="print"/>
+          <a:stretch>
+            <a:fillRect/>
+          </a:stretch>
+        </p:blipFill>
+        <p:spPr>
+          <a:xfrm>
+            <a:off x="4800600" y="4191000"/>
+            <a:ext cx="3124200" cy="2343150"/>
+          </a:xfrm>
+          <a:prstGeom prst="rect">
+            <a:avLst/>
+          </a:prstGeom>
+        </p:spPr>
+      </p:pic>
     </p:spTree>
   </p:cSld>
   <p:clrMapOvr>

</xml_diff>